<commit_message>
Updated lecture 1 slides
</commit_message>
<xml_diff>
--- a/Lecture 1/Autograd.pptx
+++ b/Lecture 1/Autograd.pptx
@@ -3736,6 +3736,7 @@
   <p:clrMapOvr>
     <a:masterClrMapping/>
   </p:clrMapOvr>
+  <p:transition advTm="2024"/>
 </p:sld>
 </file>
 
@@ -5686,6 +5687,7 @@
   <p:clrMapOvr>
     <a:masterClrMapping/>
   </p:clrMapOvr>
+  <p:transition advTm="3000"/>
 </p:sld>
 </file>
 
@@ -7780,6 +7782,7 @@
   <p:clrMapOvr>
     <a:masterClrMapping/>
   </p:clrMapOvr>
+  <p:transition advTm="3000"/>
 </p:sld>
 </file>
 
@@ -8380,6 +8383,7 @@
   <p:clrMapOvr>
     <a:masterClrMapping/>
   </p:clrMapOvr>
+  <p:transition advTm="3000"/>
 </p:sld>
 </file>
 
@@ -9077,6 +9081,7 @@
   <p:clrMapOvr>
     <a:masterClrMapping/>
   </p:clrMapOvr>
+  <p:transition advTm="3000"/>
 </p:sld>
 </file>
 
@@ -10658,6 +10663,7 @@
   <p:clrMapOvr>
     <a:masterClrMapping/>
   </p:clrMapOvr>
+  <p:transition advTm="3000"/>
 </p:sld>
 </file>
 
@@ -12788,6 +12794,7 @@
   <p:clrMapOvr>
     <a:masterClrMapping/>
   </p:clrMapOvr>
+  <p:transition advTm="3000"/>
   <p:timing>
     <p:tnLst>
       <p:par>
@@ -15075,6 +15082,7 @@
   <p:clrMapOvr>
     <a:masterClrMapping/>
   </p:clrMapOvr>
+  <p:transition advTm="3000"/>
   <p:timing>
     <p:tnLst>
       <p:par>
@@ -16696,6 +16704,7 @@
   <p:clrMapOvr>
     <a:masterClrMapping/>
   </p:clrMapOvr>
+  <p:transition advTm="3000"/>
 </p:sld>
 </file>
 
@@ -17966,6 +17975,7 @@
   <p:clrMapOvr>
     <a:masterClrMapping/>
   </p:clrMapOvr>
+  <p:transition advTm="3000"/>
   <p:timing>
     <p:tnLst>
       <p:par>
@@ -20092,6 +20102,7 @@
   <p:clrMapOvr>
     <a:masterClrMapping/>
   </p:clrMapOvr>
+  <p:transition advTm="3000"/>
 </p:sld>
 </file>
 
@@ -20953,6 +20964,7 @@
   <p:clrMapOvr>
     <a:masterClrMapping/>
   </p:clrMapOvr>
+  <p:transition advTm="1069"/>
 </p:sld>
 </file>
 
@@ -22282,6 +22294,7 @@
   <p:clrMapOvr>
     <a:masterClrMapping/>
   </p:clrMapOvr>
+  <p:transition advTm="3000"/>
   <p:timing>
     <p:tnLst>
       <p:par>
@@ -24020,6 +24033,7 @@
   <p:clrMapOvr>
     <a:masterClrMapping/>
   </p:clrMapOvr>
+  <p:transition advTm="3000"/>
 </p:sld>
 </file>
 
@@ -25329,6 +25343,7 @@
   <p:clrMapOvr>
     <a:masterClrMapping/>
   </p:clrMapOvr>
+  <p:transition advTm="3000"/>
   <p:timing>
     <p:tnLst>
       <p:par>
@@ -26663,6 +26678,7 @@
   <p:clrMapOvr>
     <a:masterClrMapping/>
   </p:clrMapOvr>
+  <p:transition advTm="3000"/>
 </p:sld>
 </file>
 
@@ -28408,6 +28424,7 @@
   <p:clrMapOvr>
     <a:masterClrMapping/>
   </p:clrMapOvr>
+  <p:transition advTm="3000"/>
 </p:sld>
 </file>
 
@@ -30508,6 +30525,7 @@
   <p:clrMapOvr>
     <a:masterClrMapping/>
   </p:clrMapOvr>
+  <p:transition advTm="3000"/>
 </p:sld>
 </file>
 
@@ -32543,6 +32561,7 @@
   <p:clrMapOvr>
     <a:masterClrMapping/>
   </p:clrMapOvr>
+  <p:transition advTm="3000"/>
 </p:sld>
 </file>
 
@@ -33886,6 +33905,7 @@
   <p:clrMapOvr>
     <a:masterClrMapping/>
   </p:clrMapOvr>
+  <p:transition advTm="3000"/>
 </p:sld>
 </file>
 
@@ -34558,6 +34578,7 @@
   <p:clrMapOvr>
     <a:masterClrMapping/>
   </p:clrMapOvr>
+  <p:transition advTm="3000"/>
 </p:sld>
 </file>
 
@@ -34997,6 +35018,7 @@
   <p:clrMapOvr>
     <a:masterClrMapping/>
   </p:clrMapOvr>
+  <p:transition advTm="3000"/>
 </p:sld>
 </file>
 
@@ -35752,6 +35774,7 @@
   <p:clrMapOvr>
     <a:masterClrMapping/>
   </p:clrMapOvr>
+  <p:transition advTm="88984"/>
 </p:sld>
 </file>
 
@@ -37231,6 +37254,7 @@
   <p:clrMapOvr>
     <a:masterClrMapping/>
   </p:clrMapOvr>
+  <p:transition advTm="3000"/>
 </p:sld>
 </file>
 
@@ -38057,6 +38081,7 @@
   <p:clrMapOvr>
     <a:masterClrMapping/>
   </p:clrMapOvr>
+  <p:transition advTm="3000"/>
 </p:sld>
 </file>
 
@@ -38341,6 +38366,7 @@
   <p:clrMapOvr>
     <a:masterClrMapping/>
   </p:clrMapOvr>
+  <p:transition advTm="3000"/>
 </p:sld>
 </file>
 
@@ -39284,6 +39310,7 @@
   <p:clrMapOvr>
     <a:masterClrMapping/>
   </p:clrMapOvr>
+  <p:transition advTm="3000"/>
 </p:sld>
 </file>
 
@@ -40312,6 +40339,7 @@
   <p:clrMapOvr>
     <a:masterClrMapping/>
   </p:clrMapOvr>
+  <p:transition advTm="3000"/>
 </p:sld>
 </file>
 
@@ -41768,6 +41796,7 @@
   <p:clrMapOvr>
     <a:masterClrMapping/>
   </p:clrMapOvr>
+  <p:transition advTm="3000"/>
 </p:sld>
 </file>
 
@@ -42119,6 +42148,7 @@
   <p:clrMapOvr>
     <a:masterClrMapping/>
   </p:clrMapOvr>
+  <p:transition advTm="3000"/>
 </p:sld>
 </file>
 
@@ -44287,6 +44317,7 @@
   <p:clrMapOvr>
     <a:masterClrMapping/>
   </p:clrMapOvr>
+  <p:transition advTm="3000"/>
   <p:timing>
     <p:tnLst>
       <p:par>

</xml_diff>